<commit_message>
Fallo de transparencia corregido
</commit_message>
<xml_diff>
--- a/especificacion_de_requisitos/Presentación Requisitos (Abrir con Windows).pptx
+++ b/especificacion_de_requisitos/Presentación Requisitos (Abrir con Windows).pptx
@@ -204,7 +204,8 @@
           <a:p>
             <a:fld id="{8B05F895-EAF4-48AD-BE3B-0444771D8251}" type="datetimeFigureOut">
               <a:rPr lang="es-ES" smtClean="0"/>
-              <a:t>24/02/2014</a:t>
+              <a:pPr/>
+              <a:t>25/02/2014</a:t>
             </a:fld>
             <a:endParaRPr lang="es-ES"/>
           </a:p>
@@ -365,6 +366,7 @@
           <a:p>
             <a:fld id="{3BFA82A9-BC5D-43D1-BA95-BD17A21CBA09}" type="slidenum">
               <a:rPr lang="es-ES" smtClean="0"/>
+              <a:pPr/>
               <a:t>‹Nº›</a:t>
             </a:fld>
             <a:endParaRPr lang="es-ES"/>
@@ -536,6 +538,7 @@
           <a:p>
             <a:fld id="{3BFA82A9-BC5D-43D1-BA95-BD17A21CBA09}" type="slidenum">
               <a:rPr lang="es-ES" smtClean="0"/>
+              <a:pPr/>
               <a:t>5</a:t>
             </a:fld>
             <a:endParaRPr lang="es-ES"/>
@@ -684,7 +687,8 @@
           <a:p>
             <a:fld id="{0D1831A6-6E9E-410E-B804-A816D3263570}" type="datetimeFigureOut">
               <a:rPr lang="es-ES" smtClean="0"/>
-              <a:t>24/02/2014</a:t>
+              <a:pPr/>
+              <a:t>25/02/2014</a:t>
             </a:fld>
             <a:endParaRPr lang="es-ES"/>
           </a:p>
@@ -730,6 +734,7 @@
           <a:p>
             <a:fld id="{F5DA0125-D534-4741-A159-D49E7D7ACFFB}" type="slidenum">
               <a:rPr lang="es-ES" smtClean="0"/>
+              <a:pPr/>
               <a:t>‹Nº›</a:t>
             </a:fld>
             <a:endParaRPr lang="es-ES"/>
@@ -997,7 +1002,8 @@
           <a:p>
             <a:fld id="{0D1831A6-6E9E-410E-B804-A816D3263570}" type="datetimeFigureOut">
               <a:rPr lang="es-ES" smtClean="0"/>
-              <a:t>24/02/2014</a:t>
+              <a:pPr/>
+              <a:t>25/02/2014</a:t>
             </a:fld>
             <a:endParaRPr lang="es-ES"/>
           </a:p>
@@ -1043,6 +1049,7 @@
           <a:p>
             <a:fld id="{F5DA0125-D534-4741-A159-D49E7D7ACFFB}" type="slidenum">
               <a:rPr lang="es-ES" smtClean="0"/>
+              <a:pPr/>
               <a:t>‹Nº›</a:t>
             </a:fld>
             <a:endParaRPr lang="es-ES"/>
@@ -1182,7 +1189,8 @@
           <a:p>
             <a:fld id="{0D1831A6-6E9E-410E-B804-A816D3263570}" type="datetimeFigureOut">
               <a:rPr lang="es-ES" smtClean="0"/>
-              <a:t>24/02/2014</a:t>
+              <a:pPr/>
+              <a:t>25/02/2014</a:t>
             </a:fld>
             <a:endParaRPr lang="es-ES"/>
           </a:p>
@@ -1228,6 +1236,7 @@
           <a:p>
             <a:fld id="{F5DA0125-D534-4741-A159-D49E7D7ACFFB}" type="slidenum">
               <a:rPr lang="es-ES" smtClean="0"/>
+              <a:pPr/>
               <a:t>‹Nº›</a:t>
             </a:fld>
             <a:endParaRPr lang="es-ES"/>
@@ -1357,7 +1366,8 @@
           <a:p>
             <a:fld id="{0D1831A6-6E9E-410E-B804-A816D3263570}" type="datetimeFigureOut">
               <a:rPr lang="es-ES" smtClean="0"/>
-              <a:t>24/02/2014</a:t>
+              <a:pPr/>
+              <a:t>25/02/2014</a:t>
             </a:fld>
             <a:endParaRPr lang="es-ES"/>
           </a:p>
@@ -1403,6 +1413,7 @@
           <a:p>
             <a:fld id="{F5DA0125-D534-4741-A159-D49E7D7ACFFB}" type="slidenum">
               <a:rPr lang="es-ES" smtClean="0"/>
+              <a:pPr/>
               <a:t>‹Nº›</a:t>
             </a:fld>
             <a:endParaRPr lang="es-ES"/>
@@ -1625,7 +1636,8 @@
           <a:p>
             <a:fld id="{0D1831A6-6E9E-410E-B804-A816D3263570}" type="datetimeFigureOut">
               <a:rPr lang="es-ES" smtClean="0"/>
-              <a:t>24/02/2014</a:t>
+              <a:pPr/>
+              <a:t>25/02/2014</a:t>
             </a:fld>
             <a:endParaRPr lang="es-ES"/>
           </a:p>
@@ -1671,6 +1683,7 @@
           <a:p>
             <a:fld id="{F5DA0125-D534-4741-A159-D49E7D7ACFFB}" type="slidenum">
               <a:rPr lang="es-ES" smtClean="0"/>
+              <a:pPr/>
               <a:t>‹Nº›</a:t>
             </a:fld>
             <a:endParaRPr lang="es-ES"/>
@@ -2093,7 +2106,8 @@
           <a:p>
             <a:fld id="{0D1831A6-6E9E-410E-B804-A816D3263570}" type="datetimeFigureOut">
               <a:rPr lang="es-ES" smtClean="0"/>
-              <a:t>24/02/2014</a:t>
+              <a:pPr/>
+              <a:t>25/02/2014</a:t>
             </a:fld>
             <a:endParaRPr lang="es-ES"/>
           </a:p>
@@ -2139,6 +2153,7 @@
           <a:p>
             <a:fld id="{F5DA0125-D534-4741-A159-D49E7D7ACFFB}" type="slidenum">
               <a:rPr lang="es-ES" smtClean="0"/>
+              <a:pPr/>
               <a:t>‹Nº›</a:t>
             </a:fld>
             <a:endParaRPr lang="es-ES"/>
@@ -2582,7 +2597,8 @@
           <a:p>
             <a:fld id="{0D1831A6-6E9E-410E-B804-A816D3263570}" type="datetimeFigureOut">
               <a:rPr lang="es-ES" smtClean="0"/>
-              <a:t>24/02/2014</a:t>
+              <a:pPr/>
+              <a:t>25/02/2014</a:t>
             </a:fld>
             <a:endParaRPr lang="es-ES"/>
           </a:p>
@@ -2628,6 +2644,7 @@
           <a:p>
             <a:fld id="{F5DA0125-D534-4741-A159-D49E7D7ACFFB}" type="slidenum">
               <a:rPr lang="es-ES" smtClean="0"/>
+              <a:pPr/>
               <a:t>‹Nº›</a:t>
             </a:fld>
             <a:endParaRPr lang="es-ES"/>
@@ -2708,7 +2725,8 @@
           <a:p>
             <a:fld id="{0D1831A6-6E9E-410E-B804-A816D3263570}" type="datetimeFigureOut">
               <a:rPr lang="es-ES" smtClean="0"/>
-              <a:t>24/02/2014</a:t>
+              <a:pPr/>
+              <a:t>25/02/2014</a:t>
             </a:fld>
             <a:endParaRPr lang="es-ES"/>
           </a:p>
@@ -2754,6 +2772,7 @@
           <a:p>
             <a:fld id="{F5DA0125-D534-4741-A159-D49E7D7ACFFB}" type="slidenum">
               <a:rPr lang="es-ES" smtClean="0"/>
+              <a:pPr/>
               <a:t>‹Nº›</a:t>
             </a:fld>
             <a:endParaRPr lang="es-ES"/>
@@ -2852,7 +2871,8 @@
           <a:p>
             <a:fld id="{0D1831A6-6E9E-410E-B804-A816D3263570}" type="datetimeFigureOut">
               <a:rPr lang="es-ES" smtClean="0"/>
-              <a:t>24/02/2014</a:t>
+              <a:pPr/>
+              <a:t>25/02/2014</a:t>
             </a:fld>
             <a:endParaRPr lang="es-ES"/>
           </a:p>
@@ -2898,6 +2918,7 @@
           <a:p>
             <a:fld id="{F5DA0125-D534-4741-A159-D49E7D7ACFFB}" type="slidenum">
               <a:rPr lang="es-ES" smtClean="0"/>
+              <a:pPr/>
               <a:t>‹Nº›</a:t>
             </a:fld>
             <a:endParaRPr lang="es-ES"/>
@@ -3174,7 +3195,8 @@
           <a:p>
             <a:fld id="{0D1831A6-6E9E-410E-B804-A816D3263570}" type="datetimeFigureOut">
               <a:rPr lang="es-ES" smtClean="0"/>
-              <a:t>24/02/2014</a:t>
+              <a:pPr/>
+              <a:t>25/02/2014</a:t>
             </a:fld>
             <a:endParaRPr lang="es-ES"/>
           </a:p>
@@ -3220,6 +3242,7 @@
           <a:p>
             <a:fld id="{F5DA0125-D534-4741-A159-D49E7D7ACFFB}" type="slidenum">
               <a:rPr lang="es-ES" smtClean="0"/>
+              <a:pPr/>
               <a:t>‹Nº›</a:t>
             </a:fld>
             <a:endParaRPr lang="es-ES"/>
@@ -3308,7 +3331,8 @@
           <a:p>
             <a:fld id="{0D1831A6-6E9E-410E-B804-A816D3263570}" type="datetimeFigureOut">
               <a:rPr lang="es-ES" smtClean="0"/>
-              <a:t>24/02/2014</a:t>
+              <a:pPr/>
+              <a:t>25/02/2014</a:t>
             </a:fld>
             <a:endParaRPr lang="es-ES"/>
           </a:p>
@@ -3354,6 +3378,7 @@
           <a:p>
             <a:fld id="{F5DA0125-D534-4741-A159-D49E7D7ACFFB}" type="slidenum">
               <a:rPr lang="es-ES" smtClean="0"/>
+              <a:pPr/>
               <a:t>‹Nº›</a:t>
             </a:fld>
             <a:endParaRPr lang="es-ES"/>
@@ -4089,7 +4114,8 @@
           <a:p>
             <a:fld id="{0D1831A6-6E9E-410E-B804-A816D3263570}" type="datetimeFigureOut">
               <a:rPr lang="es-ES" smtClean="0"/>
-              <a:t>24/02/2014</a:t>
+              <a:pPr/>
+              <a:t>25/02/2014</a:t>
             </a:fld>
             <a:endParaRPr lang="es-ES"/>
           </a:p>
@@ -4173,6 +4199,7 @@
           <a:p>
             <a:fld id="{F5DA0125-D534-4741-A159-D49E7D7ACFFB}" type="slidenum">
               <a:rPr lang="es-ES" smtClean="0"/>
+              <a:pPr/>
               <a:t>‹Nº›</a:t>
             </a:fld>
             <a:endParaRPr lang="es-ES"/>
@@ -5044,7 +5071,6 @@
               <a:rPr lang="es-ES" sz="2800" b="1" dirty="0" smtClean="0"/>
               <a:t>	</a:t>
             </a:r>
-            <a:endParaRPr lang="es-ES" sz="2800" b="1" dirty="0" smtClean="0"/>
           </a:p>
           <a:p>
             <a:pPr>
@@ -5171,11 +5197,7 @@
             </a:r>
             <a:r>
               <a:rPr lang="es-ES" sz="2800" dirty="0" smtClean="0"/>
-              <a:t>. Nuestra empresa se debe encargar del mantenimiento y actualización de la base de datos</a:t>
-            </a:r>
-            <a:r>
-              <a:rPr lang="es-ES" sz="2800" dirty="0" smtClean="0"/>
-              <a:t>.</a:t>
+              <a:t>. Nuestra empresa se debe encargar del mantenimiento y actualización de la base de datos.</a:t>
             </a:r>
           </a:p>
           <a:p>
@@ -5190,11 +5212,7 @@
             </a:r>
             <a:r>
               <a:rPr lang="es-ES" sz="2800" dirty="0" smtClean="0"/>
-              <a:t>. Nuestra empresa debe proporcionar soporte ante errores</a:t>
-            </a:r>
-            <a:r>
-              <a:rPr lang="es-ES" sz="2800" dirty="0" smtClean="0"/>
-              <a:t>.</a:t>
+              <a:t>. Nuestra empresa debe proporcionar soporte ante errores.</a:t>
             </a:r>
           </a:p>
           <a:p>
@@ -5263,15 +5281,7 @@
           <a:p>
             <a:r>
               <a:rPr lang="es-ES" dirty="0" smtClean="0"/>
-              <a:t>Requisitos no Funcionales (</a:t>
-            </a:r>
-            <a:r>
-              <a:rPr lang="es-ES" dirty="0" smtClean="0"/>
-              <a:t>III</a:t>
-            </a:r>
-            <a:r>
-              <a:rPr lang="es-ES" dirty="0" smtClean="0"/>
-              <a:t>)</a:t>
+              <a:t>Requisitos no Funcionales (III)</a:t>
             </a:r>
             <a:endParaRPr lang="es-ES" dirty="0"/>
           </a:p>
@@ -5315,11 +5325,7 @@
             </a:r>
             <a:r>
               <a:rPr lang="es-ES" sz="3000" dirty="0" smtClean="0"/>
-              <a:t>. Al ser una aplicación web esta puede ser accesible desde cualquier navegador y desde cualquier sistema operativo</a:t>
-            </a:r>
-            <a:r>
-              <a:rPr lang="es-ES" sz="3000" dirty="0" smtClean="0"/>
-              <a:t>.</a:t>
+              <a:t>. Al ser una aplicación web esta puede ser accesible desde cualquier navegador y desde cualquier sistema operativo.</a:t>
             </a:r>
           </a:p>
           <a:p>
@@ -5469,7 +5475,6 @@
               <a:rPr lang="es-ES" sz="2800" dirty="0" smtClean="0"/>
               <a:t>Permite ver la lista de artículos de un supermercado dado.</a:t>
             </a:r>
-            <a:endParaRPr lang="es-ES" sz="2800" dirty="0" smtClean="0"/>
           </a:p>
         </p:txBody>
       </p:sp>
@@ -5575,10 +5580,9 @@
             <a:endParaRPr lang="es-ES" dirty="0" smtClean="0"/>
           </a:p>
           <a:p>
-            <a:r>
-              <a:rPr lang="es-ES" dirty="0" smtClean="0"/>
-              <a:t>Restricciones</a:t>
-            </a:r>
+            <a:pPr>
+              <a:buNone/>
+            </a:pPr>
             <a:endParaRPr lang="es-ES" dirty="0"/>
           </a:p>
         </p:txBody>
@@ -5664,7 +5668,6 @@
               <a:rPr lang="es-ES" sz="2800" dirty="0" smtClean="0"/>
               <a:t>: El sistema debe permitir seleccionar un tipo de producto en un menú, proporcionando una sugerencia óptima en base al precio y a la puntuación de las encuestas.  </a:t>
             </a:r>
-            <a:endParaRPr lang="es-ES" sz="2800" dirty="0" smtClean="0"/>
           </a:p>
           <a:p>
             <a:pPr lvl="0"/>
@@ -5761,11 +5764,7 @@
             </a:r>
             <a:r>
               <a:rPr lang="es-ES" sz="2800" dirty="0" smtClean="0"/>
-              <a:t>: Se debe dar la posibilidad de rechazar una sugerencia de producto o supermercado, y que aparezca en su lugar la siguiente mejor</a:t>
-            </a:r>
-            <a:r>
-              <a:rPr lang="es-ES" sz="2800" dirty="0" smtClean="0"/>
-              <a:t>.</a:t>
+              <a:t>: Se debe dar la posibilidad de rechazar una sugerencia de producto o supermercado, y que aparezca en su lugar la siguiente mejor.</a:t>
             </a:r>
           </a:p>
           <a:p>
@@ -5788,11 +5787,7 @@
             </a:r>
             <a:r>
               <a:rPr lang="es-ES" sz="2800" dirty="0" smtClean="0"/>
-              <a:t> de </a:t>
-            </a:r>
-            <a:r>
-              <a:rPr lang="es-ES" sz="2800" dirty="0" smtClean="0"/>
-              <a:t>usuarios.</a:t>
+              <a:t> de usuarios.</a:t>
             </a:r>
           </a:p>
           <a:p>
@@ -5811,13 +5806,8 @@
             </a:r>
             <a:r>
               <a:rPr lang="es-ES" sz="2400" dirty="0" smtClean="0"/>
-              <a:t> con nuevas ofertas  a los usuarios </a:t>
-            </a:r>
-            <a:r>
-              <a:rPr lang="es-ES" sz="2400" dirty="0" smtClean="0"/>
-              <a:t>registrados.</a:t>
-            </a:r>
-            <a:endParaRPr lang="es-ES" sz="2400" dirty="0" smtClean="0"/>
+              <a:t> con nuevas ofertas  a los usuarios registrados.</a:t>
+            </a:r>
           </a:p>
           <a:p>
             <a:pPr lvl="0"/>
@@ -5877,15 +5867,7 @@
           <a:p>
             <a:r>
               <a:rPr lang="es-ES" dirty="0" smtClean="0"/>
-              <a:t>Requisitos Funcionales </a:t>
-            </a:r>
-            <a:r>
-              <a:rPr lang="es-ES" dirty="0" smtClean="0"/>
-              <a:t>(II</a:t>
-            </a:r>
-            <a:r>
-              <a:rPr lang="es-ES" dirty="0" smtClean="0"/>
-              <a:t>)</a:t>
+              <a:t>Requisitos Funcionales (II)</a:t>
             </a:r>
             <a:endParaRPr lang="es-ES" dirty="0"/>
           </a:p>
@@ -5913,11 +5895,7 @@
             </a:r>
             <a:r>
               <a:rPr lang="es-ES" sz="2800" dirty="0" smtClean="0"/>
-              <a:t>: Se registran las últimas 5 listas de la compra realizadas por un </a:t>
-            </a:r>
-            <a:r>
-              <a:rPr lang="es-ES" sz="2800" dirty="0" smtClean="0"/>
-              <a:t>usuario.</a:t>
+              <a:t>: Se registran las últimas 5 listas de la compra realizadas por un usuario.</a:t>
             </a:r>
           </a:p>
           <a:p>
@@ -5931,11 +5909,7 @@
             </a:r>
             <a:r>
               <a:rPr lang="es-ES" sz="2800" dirty="0" smtClean="0"/>
-              <a:t>: Tiene que haber un mapa que separe el sistema por regiones geográficas</a:t>
-            </a:r>
-            <a:r>
-              <a:rPr lang="es-ES" sz="2800" dirty="0" smtClean="0"/>
-              <a:t>.(*)</a:t>
+              <a:t>: Tiene que haber un mapa que separe el sistema por regiones geográficas.(*)</a:t>
             </a:r>
           </a:p>
           <a:p>
@@ -5949,13 +5923,8 @@
             </a:r>
             <a:r>
               <a:rPr lang="es-ES" sz="2800" dirty="0" smtClean="0"/>
-              <a:t>: Se tiene implementar el servicio de compra online de manera transparente al usuario</a:t>
-            </a:r>
-            <a:r>
-              <a:rPr lang="es-ES" sz="2800" dirty="0" smtClean="0"/>
-              <a:t>.(*)</a:t>
-            </a:r>
-            <a:endParaRPr lang="es-ES" sz="2800" dirty="0" smtClean="0"/>
+              <a:t>: Se tiene implementar el servicio de compra online de manera transparente al usuario.(*)</a:t>
+            </a:r>
           </a:p>
           <a:p>
             <a:endParaRPr lang="es-ES" sz="2800" dirty="0" smtClean="0"/>
@@ -6014,11 +5983,7 @@
           <a:p>
             <a:r>
               <a:rPr lang="es-ES" dirty="0" smtClean="0"/>
-              <a:t>Requisitos Funcionales (</a:t>
-            </a:r>
-            <a:r>
-              <a:rPr lang="es-ES" dirty="0" smtClean="0"/>
-              <a:t>III)</a:t>
+              <a:t>Requisitos Funcionales (III)</a:t>
             </a:r>
             <a:endParaRPr lang="es-ES" dirty="0"/>
           </a:p>
@@ -6048,13 +6013,8 @@
             </a:r>
             <a:r>
               <a:rPr lang="es-ES" sz="2800" dirty="0" smtClean="0"/>
-              <a:t>: El sistema debe permitir la posibilidad de realizar encuestas de calidad de productos y comercios, así como del propio servicio </a:t>
-            </a:r>
-            <a:r>
-              <a:rPr lang="es-ES" sz="2800" dirty="0" smtClean="0"/>
-              <a:t>web.</a:t>
-            </a:r>
-            <a:endParaRPr lang="es-ES" sz="2800" dirty="0" smtClean="0"/>
+              <a:t>: El sistema debe permitir la posibilidad de realizar encuestas de calidad de productos y comercios, así como del propio servicio web.</a:t>
+            </a:r>
           </a:p>
           <a:p>
             <a:pPr lvl="1"/>
@@ -6075,13 +6035,8 @@
             </a:r>
             <a:r>
               <a:rPr lang="es-ES" sz="2400" dirty="0" smtClean="0"/>
-              <a:t>: El sistema debe realizar un ranking de comercios en función de los datos de calidad proporcionados por el </a:t>
-            </a:r>
-            <a:r>
-              <a:rPr lang="es-ES" sz="2400" dirty="0" smtClean="0"/>
-              <a:t>usuario.</a:t>
-            </a:r>
-            <a:endParaRPr lang="es-ES" sz="2400" dirty="0" smtClean="0"/>
+              <a:t>: El sistema debe realizar un ranking de comercios en función de los datos de calidad proporcionados por el usuario.</a:t>
+            </a:r>
           </a:p>
           <a:p>
             <a:endParaRPr lang="es-ES" dirty="0"/>
@@ -6137,11 +6092,7 @@
           <a:p>
             <a:r>
               <a:rPr lang="es-ES" dirty="0" smtClean="0"/>
-              <a:t>Requisitos Funcionales </a:t>
-            </a:r>
-            <a:r>
-              <a:rPr lang="es-ES" dirty="0" smtClean="0"/>
-              <a:t>(IV)</a:t>
+              <a:t>Requisitos Funcionales (IV)</a:t>
             </a:r>
             <a:endParaRPr lang="es-ES" dirty="0"/>
           </a:p>
@@ -6179,13 +6130,8 @@
             </a:r>
             <a:r>
               <a:rPr lang="es-ES" sz="2800" dirty="0" smtClean="0"/>
-              <a:t>” del </a:t>
-            </a:r>
-            <a:r>
-              <a:rPr lang="es-ES" sz="2800" dirty="0" smtClean="0"/>
-              <a:t>servicio.</a:t>
-            </a:r>
-            <a:endParaRPr lang="es-ES" sz="2800" dirty="0" smtClean="0"/>
+              <a:t>” del servicio.</a:t>
+            </a:r>
           </a:p>
           <a:p>
             <a:pPr lvl="0"/>
@@ -6214,13 +6160,8 @@
             </a:r>
             <a:r>
               <a:rPr lang="es-ES" sz="2800" dirty="0" smtClean="0"/>
-              <a:t>: La web debe disponer de un ayudante interactivo</a:t>
-            </a:r>
-            <a:r>
-              <a:rPr lang="es-ES" sz="2800" dirty="0" smtClean="0"/>
-              <a:t>.(*)</a:t>
-            </a:r>
-            <a:endParaRPr lang="es-ES" sz="2800" dirty="0" smtClean="0"/>
+              <a:t>: La web debe disponer de un ayudante interactivo.(*)</a:t>
+            </a:r>
           </a:p>
           <a:p>
             <a:pPr lvl="0"/>
@@ -6291,11 +6232,7 @@
           <a:p>
             <a:r>
               <a:rPr lang="es-ES" dirty="0" smtClean="0"/>
-              <a:t>Requisitos Funcionales </a:t>
-            </a:r>
-            <a:r>
-              <a:rPr lang="es-ES" dirty="0" smtClean="0"/>
-              <a:t>(*)</a:t>
+              <a:t>Requisitos Funcionales (*)</a:t>
             </a:r>
             <a:endParaRPr lang="es-ES" dirty="0"/>
           </a:p>

</xml_diff>

<commit_message>
Actualizada presentación por errores
</commit_message>
<xml_diff>
--- a/especificacion_de_requisitos/Presentación Requisitos (Abrir con Windows).pptx
+++ b/especificacion_de_requisitos/Presentación Requisitos (Abrir con Windows).pptx
@@ -5,22 +5,24 @@
     <p:sldMasterId id="2147483660" r:id="rId1"/>
   </p:sldMasterIdLst>
   <p:notesMasterIdLst>
-    <p:notesMasterId r:id="rId15"/>
+    <p:notesMasterId r:id="rId17"/>
   </p:notesMasterIdLst>
   <p:sldIdLst>
     <p:sldId id="256" r:id="rId2"/>
-    <p:sldId id="257" r:id="rId3"/>
-    <p:sldId id="258" r:id="rId4"/>
-    <p:sldId id="259" r:id="rId5"/>
-    <p:sldId id="260" r:id="rId6"/>
-    <p:sldId id="261" r:id="rId7"/>
-    <p:sldId id="262" r:id="rId8"/>
-    <p:sldId id="264" r:id="rId9"/>
-    <p:sldId id="263" r:id="rId10"/>
-    <p:sldId id="265" r:id="rId11"/>
-    <p:sldId id="266" r:id="rId12"/>
-    <p:sldId id="267" r:id="rId13"/>
-    <p:sldId id="268" r:id="rId14"/>
+    <p:sldId id="270" r:id="rId3"/>
+    <p:sldId id="257" r:id="rId4"/>
+    <p:sldId id="258" r:id="rId5"/>
+    <p:sldId id="259" r:id="rId6"/>
+    <p:sldId id="260" r:id="rId7"/>
+    <p:sldId id="261" r:id="rId8"/>
+    <p:sldId id="262" r:id="rId9"/>
+    <p:sldId id="264" r:id="rId10"/>
+    <p:sldId id="269" r:id="rId11"/>
+    <p:sldId id="263" r:id="rId12"/>
+    <p:sldId id="265" r:id="rId13"/>
+    <p:sldId id="266" r:id="rId14"/>
+    <p:sldId id="267" r:id="rId15"/>
+    <p:sldId id="268" r:id="rId16"/>
   </p:sldIdLst>
   <p:sldSz cx="9144000" cy="6858000" type="screen4x3"/>
   <p:notesSz cx="6858000" cy="9144000"/>
@@ -539,7 +541,7 @@
             <a:fld id="{3BFA82A9-BC5D-43D1-BA95-BD17A21CBA09}" type="slidenum">
               <a:rPr lang="es-ES" smtClean="0"/>
               <a:pPr/>
-              <a:t>5</a:t>
+              <a:t>6</a:t>
             </a:fld>
             <a:endParaRPr lang="es-ES"/>
           </a:p>
@@ -4918,7 +4920,7 @@
           <a:p>
             <a:r>
               <a:rPr lang="es-ES" dirty="0" smtClean="0"/>
-              <a:t>Requisitos Funcionales (*)</a:t>
+              <a:t>Requisitos Funcionales (V)</a:t>
             </a:r>
             <a:endParaRPr lang="es-ES" dirty="0"/>
           </a:p>
@@ -4934,27 +4936,47 @@
             <p:ph idx="1"/>
           </p:nvPr>
         </p:nvSpPr>
-        <p:spPr>
-          <a:xfrm>
-            <a:off x="1428728" y="2357430"/>
-            <a:ext cx="7498080" cy="4800600"/>
-          </a:xfrm>
-        </p:spPr>
-        <p:txBody>
-          <a:bodyPr>
-            <a:normAutofit/>
-          </a:bodyPr>
+        <p:spPr/>
+        <p:txBody>
+          <a:bodyPr/>
           <a:lstStyle/>
           <a:p>
-            <a:r>
-              <a:rPr lang="es-ES" sz="2800" b="1" dirty="0" smtClean="0"/>
-              <a:t>Ayudante</a:t>
-            </a:r>
-            <a:r>
-              <a:rPr lang="es-ES" sz="2800" dirty="0" smtClean="0"/>
-              <a:t>. Se rechaza debido a que es muy costoso en cuanto a recursos y desarrollo. Además, la complejidad de la web no requiere esta inversión.</a:t>
-            </a:r>
-            <a:endParaRPr lang="es-ES" sz="2800" dirty="0"/>
+            <a:endParaRPr lang="es-ES" b="1" dirty="0" smtClean="0"/>
+          </a:p>
+          <a:p>
+            <a:r>
+              <a:rPr lang="es-ES" b="1" dirty="0" smtClean="0"/>
+              <a:t>Idiomas: </a:t>
+            </a:r>
+            <a:r>
+              <a:rPr lang="es-ES" dirty="0" smtClean="0"/>
+              <a:t>La web se deberá ofrecer tanto en español como en inglés y portugués. </a:t>
+            </a:r>
+          </a:p>
+          <a:p>
+            <a:endParaRPr lang="es-ES" b="1" dirty="0" smtClean="0"/>
+          </a:p>
+          <a:p>
+            <a:pPr lvl="0"/>
+            <a:r>
+              <a:rPr lang="es-ES" b="1" dirty="0" smtClean="0"/>
+              <a:t>Categorías </a:t>
+            </a:r>
+            <a:r>
+              <a:rPr lang="es-ES" dirty="0" smtClean="0"/>
+              <a:t>: El sistema  debe agrupar los alimentos por categorías (lácteos, fruta, </a:t>
+            </a:r>
+            <a:r>
+              <a:rPr lang="es-ES" dirty="0" err="1" smtClean="0"/>
+              <a:t>etc</a:t>
+            </a:r>
+            <a:r>
+              <a:rPr lang="es-ES" dirty="0" smtClean="0"/>
+              <a:t>).</a:t>
+            </a:r>
+          </a:p>
+          <a:p>
+            <a:endParaRPr lang="es-ES" b="1" dirty="0"/>
           </a:p>
         </p:txBody>
       </p:sp>
@@ -4963,13 +4985,6 @@
   <p:clrMapOvr>
     <a:masterClrMapping/>
   </p:clrMapOvr>
-  <p:timing>
-    <p:tnLst>
-      <p:par>
-        <p:cTn id="1" dur="indefinite" restart="never" nodeType="tmRoot"/>
-      </p:par>
-    </p:tnLst>
-  </p:timing>
 </p:sld>
 </file>
 
@@ -5007,7 +5022,7 @@
           <a:p>
             <a:r>
               <a:rPr lang="es-ES" dirty="0" smtClean="0"/>
-              <a:t>Requisitos no Funcionales (I)</a:t>
+              <a:t>Requisitos Funcionales (*)</a:t>
             </a:r>
             <a:endParaRPr lang="es-ES" dirty="0"/>
           </a:p>
@@ -5026,77 +5041,78 @@
         <p:spPr/>
         <p:txBody>
           <a:bodyPr>
-            <a:normAutofit/>
+            <a:normAutofit lnSpcReduction="10000"/>
           </a:bodyPr>
           <a:lstStyle/>
           <a:p>
-            <a:pPr>
+            <a:endParaRPr lang="es-ES" sz="2800" dirty="0" smtClean="0"/>
+          </a:p>
+          <a:p>
+            <a:r>
+              <a:rPr lang="es-ES" sz="2800" b="1" dirty="0" smtClean="0"/>
+              <a:t>Mapa</a:t>
+            </a:r>
+            <a:r>
+              <a:rPr lang="es-ES" sz="2800" dirty="0" smtClean="0"/>
+              <a:t>. Propuesta de mejor solución:</a:t>
+            </a:r>
+          </a:p>
+          <a:p>
+            <a:pPr lvl="1"/>
+            <a:r>
+              <a:rPr lang="es-ES" sz="2400" dirty="0" smtClean="0"/>
+              <a:t>1º Se permite rechazar sugerencias.(Ver </a:t>
+            </a:r>
+            <a:r>
+              <a:rPr lang="es-ES" sz="2400" b="1" dirty="0" smtClean="0"/>
+              <a:t>rechazos</a:t>
+            </a:r>
+            <a:r>
+              <a:rPr lang="es-ES" sz="2400" dirty="0" smtClean="0"/>
+              <a:t>)</a:t>
+            </a:r>
+            <a:endParaRPr lang="es-ES" sz="2400" b="1" dirty="0" smtClean="0"/>
+          </a:p>
+          <a:p>
+            <a:pPr lvl="1"/>
+            <a:r>
+              <a:rPr lang="es-ES" sz="2400" dirty="0" smtClean="0"/>
+              <a:t>2º Cada usuario puede elegir su región como atributo de usuario y aparecerán solo sugerencias para dicha región.</a:t>
+            </a:r>
+          </a:p>
+          <a:p>
+            <a:endParaRPr lang="es-ES" sz="2800" dirty="0" smtClean="0"/>
+          </a:p>
+          <a:p>
+            <a:r>
+              <a:rPr lang="es-ES" sz="2800" b="1" dirty="0" smtClean="0"/>
+              <a:t>Compra</a:t>
+            </a:r>
+            <a:r>
+              <a:rPr lang="es-ES" sz="2800" dirty="0" smtClean="0"/>
+              <a:t>. Se </a:t>
+            </a:r>
+            <a:r>
+              <a:rPr lang="es-ES" sz="2800" dirty="0" smtClean="0"/>
+              <a:t>propone negociación en </a:t>
+            </a:r>
+            <a:r>
+              <a:rPr lang="es-ES" sz="2800" dirty="0" smtClean="0"/>
+              <a:t>un principio por inviabilidad (requiere de acuerdos con comercios).</a:t>
+            </a:r>
+          </a:p>
+          <a:p>
+            <a:endParaRPr lang="es-ES" sz="2800" dirty="0" smtClean="0"/>
+          </a:p>
+          <a:p>
+            <a:pPr lvl="1"/>
+            <a:endParaRPr lang="es-ES" sz="2400" dirty="0" smtClean="0"/>
+          </a:p>
+          <a:p>
+            <a:pPr lvl="1">
               <a:buNone/>
             </a:pPr>
-            <a:r>
-              <a:rPr lang="es-ES" sz="2800" b="1" dirty="0" smtClean="0"/>
-              <a:t>	</a:t>
-            </a:r>
-          </a:p>
-          <a:p>
-            <a:pPr>
-              <a:buNone/>
-            </a:pPr>
-            <a:r>
-              <a:rPr lang="es-ES" sz="2800" b="1" dirty="0" smtClean="0"/>
-              <a:t>	</a:t>
-            </a:r>
-            <a:r>
-              <a:rPr lang="es-ES" sz="2800" b="1" u="sng" dirty="0" smtClean="0"/>
-              <a:t>Fiabilidad</a:t>
-            </a:r>
-            <a:endParaRPr lang="es-ES" sz="2800" u="sng" dirty="0" smtClean="0"/>
-          </a:p>
-          <a:p>
-            <a:pPr lvl="0"/>
-            <a:r>
-              <a:rPr lang="es-ES" sz="2800" b="1" dirty="0" smtClean="0"/>
-              <a:t>Disponibilidad. </a:t>
-            </a:r>
-            <a:r>
-              <a:rPr lang="es-ES" sz="2800" dirty="0" smtClean="0"/>
-              <a:t>El sistema debe tener una disponibilidad del 98% (24/7).</a:t>
-            </a:r>
-          </a:p>
-          <a:p>
-            <a:pPr>
-              <a:buNone/>
-            </a:pPr>
-            <a:r>
-              <a:rPr lang="es-ES" sz="2800" b="1" dirty="0" smtClean="0"/>
-              <a:t>	</a:t>
-            </a:r>
-          </a:p>
-          <a:p>
-            <a:pPr>
-              <a:buNone/>
-            </a:pPr>
-            <a:r>
-              <a:rPr lang="es-ES" sz="2800" b="1" dirty="0" smtClean="0"/>
-              <a:t>	</a:t>
-            </a:r>
-            <a:r>
-              <a:rPr lang="es-ES" sz="2800" b="1" u="sng" dirty="0" smtClean="0"/>
-              <a:t>Usabilidad</a:t>
-            </a:r>
-            <a:endParaRPr lang="es-ES" sz="2800" u="sng" dirty="0" smtClean="0"/>
-          </a:p>
-          <a:p>
-            <a:pPr lvl="0"/>
-            <a:r>
-              <a:rPr lang="es-ES" sz="2800" b="1" dirty="0" smtClean="0"/>
-              <a:t>Conexión. </a:t>
-            </a:r>
-            <a:r>
-              <a:rPr lang="es-ES" sz="2800" dirty="0" smtClean="0"/>
-              <a:t>El usuario debe estar conectado a internet para utilizar la aplicación.</a:t>
-            </a:r>
-            <a:endParaRPr lang="es-ES" sz="2800" dirty="0"/>
+            <a:endParaRPr lang="es-ES" sz="2400" dirty="0" smtClean="0"/>
           </a:p>
         </p:txBody>
       </p:sp>
@@ -5149,7 +5165,7 @@
           <a:p>
             <a:r>
               <a:rPr lang="es-ES" dirty="0" smtClean="0"/>
-              <a:t>Requisitos no Funcionales (II)</a:t>
+              <a:t>Requisitos Funcionales (*)</a:t>
             </a:r>
             <a:endParaRPr lang="es-ES" dirty="0"/>
           </a:p>
@@ -5165,68 +5181,35 @@
             <p:ph idx="1"/>
           </p:nvPr>
         </p:nvSpPr>
-        <p:spPr/>
+        <p:spPr>
+          <a:xfrm>
+            <a:off x="1428728" y="2357430"/>
+            <a:ext cx="7498080" cy="4800600"/>
+          </a:xfrm>
+        </p:spPr>
         <p:txBody>
           <a:bodyPr>
             <a:normAutofit/>
           </a:bodyPr>
           <a:lstStyle/>
           <a:p>
-            <a:pPr>
-              <a:buNone/>
-            </a:pPr>
             <a:r>
               <a:rPr lang="es-ES" sz="2800" b="1" dirty="0" smtClean="0"/>
-              <a:t>	</a:t>
-            </a:r>
-            <a:r>
-              <a:rPr lang="es-ES" sz="2800" b="1" u="sng" dirty="0" err="1" smtClean="0"/>
-              <a:t>Mantenibilidad</a:t>
-            </a:r>
-            <a:endParaRPr lang="es-ES" sz="2800" u="sng" dirty="0" smtClean="0"/>
-          </a:p>
-          <a:p>
-            <a:pPr lvl="0"/>
-            <a:endParaRPr lang="es-ES" sz="2800" b="1" dirty="0" smtClean="0"/>
-          </a:p>
-          <a:p>
-            <a:pPr lvl="0"/>
-            <a:r>
-              <a:rPr lang="es-ES" sz="2800" b="1" dirty="0" smtClean="0"/>
-              <a:t>Actualización</a:t>
+              <a:t>Ayudante</a:t>
             </a:r>
             <a:r>
               <a:rPr lang="es-ES" sz="2800" dirty="0" smtClean="0"/>
-              <a:t>. Nuestra empresa se debe encargar del mantenimiento y actualización de la base de datos.</a:t>
-            </a:r>
-          </a:p>
-          <a:p>
-            <a:pPr lvl="0"/>
-            <a:endParaRPr lang="es-ES" sz="2800" dirty="0" smtClean="0"/>
-          </a:p>
-          <a:p>
-            <a:pPr lvl="0"/>
-            <a:r>
-              <a:rPr lang="es-ES" sz="2800" b="1" dirty="0" smtClean="0"/>
-              <a:t>Errores</a:t>
+              <a:t>. Se </a:t>
             </a:r>
             <a:r>
               <a:rPr lang="es-ES" sz="2800" dirty="0" smtClean="0"/>
-              <a:t>. Nuestra empresa debe proporcionar soporte ante errores.</a:t>
-            </a:r>
-          </a:p>
-          <a:p>
-            <a:pPr>
-              <a:buNone/>
-            </a:pPr>
-            <a:r>
-              <a:rPr lang="es-ES" sz="2800" b="1" dirty="0" smtClean="0"/>
-              <a:t>	</a:t>
-            </a:r>
-            <a:endParaRPr lang="es-ES" sz="2800" dirty="0" smtClean="0"/>
-          </a:p>
-          <a:p>
-            <a:endParaRPr lang="es-ES" dirty="0"/>
+              <a:t>propone negociación debido </a:t>
+            </a:r>
+            <a:r>
+              <a:rPr lang="es-ES" sz="2800" dirty="0" smtClean="0"/>
+              <a:t>a que es muy costoso en cuanto a recursos y desarrollo. Además, la complejidad de la web no requiere esta inversión.</a:t>
+            </a:r>
+            <a:endParaRPr lang="es-ES" sz="2800" dirty="0"/>
           </a:p>
         </p:txBody>
       </p:sp>
@@ -5274,6 +5257,278 @@
         </p:nvSpPr>
         <p:spPr/>
         <p:txBody>
+          <a:bodyPr/>
+          <a:lstStyle/>
+          <a:p>
+            <a:r>
+              <a:rPr lang="es-ES" dirty="0" smtClean="0"/>
+              <a:t>Requisitos no Funcionales (I)</a:t>
+            </a:r>
+            <a:endParaRPr lang="es-ES" dirty="0"/>
+          </a:p>
+        </p:txBody>
+      </p:sp>
+      <p:sp>
+        <p:nvSpPr>
+          <p:cNvPr id="3" name="2 Marcador de contenido"/>
+          <p:cNvSpPr>
+            <a:spLocks noGrp="1"/>
+          </p:cNvSpPr>
+          <p:nvPr>
+            <p:ph idx="1"/>
+          </p:nvPr>
+        </p:nvSpPr>
+        <p:spPr/>
+        <p:txBody>
+          <a:bodyPr>
+            <a:normAutofit/>
+          </a:bodyPr>
+          <a:lstStyle/>
+          <a:p>
+            <a:pPr>
+              <a:buNone/>
+            </a:pPr>
+            <a:r>
+              <a:rPr lang="es-ES" sz="2800" b="1" dirty="0" smtClean="0"/>
+              <a:t>	</a:t>
+            </a:r>
+          </a:p>
+          <a:p>
+            <a:pPr>
+              <a:buNone/>
+            </a:pPr>
+            <a:r>
+              <a:rPr lang="es-ES" sz="2800" b="1" dirty="0" smtClean="0"/>
+              <a:t>	</a:t>
+            </a:r>
+            <a:r>
+              <a:rPr lang="es-ES" sz="2800" b="1" u="sng" dirty="0" smtClean="0"/>
+              <a:t>Fiabilidad</a:t>
+            </a:r>
+            <a:endParaRPr lang="es-ES" sz="2800" u="sng" dirty="0" smtClean="0"/>
+          </a:p>
+          <a:p>
+            <a:pPr lvl="0"/>
+            <a:r>
+              <a:rPr lang="es-ES" sz="2800" b="1" dirty="0" smtClean="0"/>
+              <a:t>Disponibilidad. </a:t>
+            </a:r>
+            <a:r>
+              <a:rPr lang="es-ES" sz="2800" dirty="0" smtClean="0"/>
+              <a:t>El sistema debe tener una disponibilidad del 98% (24/7).</a:t>
+            </a:r>
+          </a:p>
+          <a:p>
+            <a:pPr>
+              <a:buNone/>
+            </a:pPr>
+            <a:r>
+              <a:rPr lang="es-ES" sz="2800" b="1" dirty="0" smtClean="0"/>
+              <a:t>	</a:t>
+            </a:r>
+          </a:p>
+          <a:p>
+            <a:pPr>
+              <a:buNone/>
+            </a:pPr>
+            <a:r>
+              <a:rPr lang="es-ES" sz="2800" b="1" dirty="0" smtClean="0"/>
+              <a:t>	</a:t>
+            </a:r>
+            <a:r>
+              <a:rPr lang="es-ES" sz="2800" b="1" u="sng" dirty="0" smtClean="0"/>
+              <a:t>Usabilidad</a:t>
+            </a:r>
+            <a:endParaRPr lang="es-ES" sz="2800" u="sng" dirty="0" smtClean="0"/>
+          </a:p>
+          <a:p>
+            <a:pPr lvl="0"/>
+            <a:r>
+              <a:rPr lang="es-ES" sz="2800" b="1" dirty="0" smtClean="0"/>
+              <a:t>Conexión. </a:t>
+            </a:r>
+            <a:r>
+              <a:rPr lang="es-ES" sz="2800" dirty="0" smtClean="0"/>
+              <a:t>El usuario debe estar conectado a internet para utilizar la aplicación.</a:t>
+            </a:r>
+            <a:endParaRPr lang="es-ES" sz="2800" dirty="0"/>
+          </a:p>
+        </p:txBody>
+      </p:sp>
+    </p:spTree>
+  </p:cSld>
+  <p:clrMapOvr>
+    <a:masterClrMapping/>
+  </p:clrMapOvr>
+  <p:timing>
+    <p:tnLst>
+      <p:par>
+        <p:cTn id="1" dur="indefinite" restart="never" nodeType="tmRoot"/>
+      </p:par>
+    </p:tnLst>
+  </p:timing>
+</p:sld>
+</file>
+
+<file path=ppt/slides/slide14.xml><?xml version="1.0" encoding="utf-8"?>
+<p:sld xmlns:a="http://schemas.openxmlformats.org/drawingml/2006/main" xmlns:r="http://schemas.openxmlformats.org/officeDocument/2006/relationships" xmlns:p="http://schemas.openxmlformats.org/presentationml/2006/main">
+  <p:cSld>
+    <p:spTree>
+      <p:nvGrpSpPr>
+        <p:cNvPr id="1" name=""/>
+        <p:cNvGrpSpPr/>
+        <p:nvPr/>
+      </p:nvGrpSpPr>
+      <p:grpSpPr>
+        <a:xfrm>
+          <a:off x="0" y="0"/>
+          <a:ext cx="0" cy="0"/>
+          <a:chOff x="0" y="0"/>
+          <a:chExt cx="0" cy="0"/>
+        </a:xfrm>
+      </p:grpSpPr>
+      <p:sp>
+        <p:nvSpPr>
+          <p:cNvPr id="2" name="1 Título"/>
+          <p:cNvSpPr>
+            <a:spLocks noGrp="1"/>
+          </p:cNvSpPr>
+          <p:nvPr>
+            <p:ph type="title"/>
+          </p:nvPr>
+        </p:nvSpPr>
+        <p:spPr/>
+        <p:txBody>
+          <a:bodyPr/>
+          <a:lstStyle/>
+          <a:p>
+            <a:r>
+              <a:rPr lang="es-ES" dirty="0" smtClean="0"/>
+              <a:t>Requisitos no Funcionales (II)</a:t>
+            </a:r>
+            <a:endParaRPr lang="es-ES" dirty="0"/>
+          </a:p>
+        </p:txBody>
+      </p:sp>
+      <p:sp>
+        <p:nvSpPr>
+          <p:cNvPr id="3" name="2 Marcador de contenido"/>
+          <p:cNvSpPr>
+            <a:spLocks noGrp="1"/>
+          </p:cNvSpPr>
+          <p:nvPr>
+            <p:ph idx="1"/>
+          </p:nvPr>
+        </p:nvSpPr>
+        <p:spPr/>
+        <p:txBody>
+          <a:bodyPr>
+            <a:normAutofit/>
+          </a:bodyPr>
+          <a:lstStyle/>
+          <a:p>
+            <a:pPr>
+              <a:buNone/>
+            </a:pPr>
+            <a:r>
+              <a:rPr lang="es-ES" sz="2800" b="1" dirty="0" smtClean="0"/>
+              <a:t>	</a:t>
+            </a:r>
+            <a:r>
+              <a:rPr lang="es-ES" sz="2800" b="1" u="sng" dirty="0" err="1" smtClean="0"/>
+              <a:t>Mantenibilidad</a:t>
+            </a:r>
+            <a:endParaRPr lang="es-ES" sz="2800" u="sng" dirty="0" smtClean="0"/>
+          </a:p>
+          <a:p>
+            <a:pPr lvl="0"/>
+            <a:endParaRPr lang="es-ES" sz="2800" b="1" dirty="0" smtClean="0"/>
+          </a:p>
+          <a:p>
+            <a:pPr lvl="0"/>
+            <a:r>
+              <a:rPr lang="es-ES" sz="2800" b="1" dirty="0" smtClean="0"/>
+              <a:t>Actualización</a:t>
+            </a:r>
+            <a:r>
+              <a:rPr lang="es-ES" sz="2800" dirty="0" smtClean="0"/>
+              <a:t>. Nuestra empresa se debe encargar del mantenimiento y actualización de la base de datos.</a:t>
+            </a:r>
+          </a:p>
+          <a:p>
+            <a:pPr lvl="0"/>
+            <a:endParaRPr lang="es-ES" sz="2800" dirty="0" smtClean="0"/>
+          </a:p>
+          <a:p>
+            <a:pPr lvl="0"/>
+            <a:r>
+              <a:rPr lang="es-ES" sz="2800" b="1" dirty="0" smtClean="0"/>
+              <a:t>Errores</a:t>
+            </a:r>
+            <a:r>
+              <a:rPr lang="es-ES" sz="2800" dirty="0" smtClean="0"/>
+              <a:t>. Nuestra empresa debe proporcionar soporte ante errores.</a:t>
+            </a:r>
+          </a:p>
+          <a:p>
+            <a:pPr>
+              <a:buNone/>
+            </a:pPr>
+            <a:r>
+              <a:rPr lang="es-ES" sz="2800" b="1" dirty="0" smtClean="0"/>
+              <a:t>	</a:t>
+            </a:r>
+            <a:endParaRPr lang="es-ES" sz="2800" dirty="0" smtClean="0"/>
+          </a:p>
+          <a:p>
+            <a:endParaRPr lang="es-ES" dirty="0"/>
+          </a:p>
+        </p:txBody>
+      </p:sp>
+    </p:spTree>
+  </p:cSld>
+  <p:clrMapOvr>
+    <a:masterClrMapping/>
+  </p:clrMapOvr>
+  <p:timing>
+    <p:tnLst>
+      <p:par>
+        <p:cTn id="1" dur="indefinite" restart="never" nodeType="tmRoot"/>
+      </p:par>
+    </p:tnLst>
+  </p:timing>
+</p:sld>
+</file>
+
+<file path=ppt/slides/slide15.xml><?xml version="1.0" encoding="utf-8"?>
+<p:sld xmlns:a="http://schemas.openxmlformats.org/drawingml/2006/main" xmlns:r="http://schemas.openxmlformats.org/officeDocument/2006/relationships" xmlns:p="http://schemas.openxmlformats.org/presentationml/2006/main">
+  <p:cSld>
+    <p:spTree>
+      <p:nvGrpSpPr>
+        <p:cNvPr id="1" name=""/>
+        <p:cNvGrpSpPr/>
+        <p:nvPr/>
+      </p:nvGrpSpPr>
+      <p:grpSpPr>
+        <a:xfrm>
+          <a:off x="0" y="0"/>
+          <a:ext cx="0" cy="0"/>
+          <a:chOff x="0" y="0"/>
+          <a:chExt cx="0" cy="0"/>
+        </a:xfrm>
+      </p:grpSpPr>
+      <p:sp>
+        <p:nvSpPr>
+          <p:cNvPr id="2" name="1 Título"/>
+          <p:cNvSpPr>
+            <a:spLocks noGrp="1"/>
+          </p:cNvSpPr>
+          <p:nvPr>
+            <p:ph type="title"/>
+          </p:nvPr>
+        </p:nvSpPr>
+        <p:spPr/>
+        <p:txBody>
           <a:bodyPr>
             <a:normAutofit fontScale="90000"/>
           </a:bodyPr>
@@ -5408,6 +5663,39 @@
           <a:chExt cx="0" cy="0"/>
         </a:xfrm>
       </p:grpSpPr>
+      <p:pic>
+        <p:nvPicPr>
+          <p:cNvPr id="1026" name="Picture 2"/>
+          <p:cNvPicPr>
+            <a:picLocks noChangeAspect="1" noChangeArrowheads="1"/>
+          </p:cNvPicPr>
+          <p:nvPr/>
+        </p:nvPicPr>
+        <p:blipFill>
+          <a:blip r:embed="rId2"/>
+          <a:srcRect/>
+          <a:stretch>
+            <a:fillRect/>
+          </a:stretch>
+        </p:blipFill>
+        <p:spPr bwMode="auto">
+          <a:xfrm>
+            <a:off x="7000875" y="428604"/>
+            <a:ext cx="2143125" cy="923925"/>
+          </a:xfrm>
+          <a:prstGeom prst="rect">
+            <a:avLst/>
+          </a:prstGeom>
+          <a:noFill/>
+          <a:ln w="9525">
+            <a:noFill/>
+            <a:miter lim="800000"/>
+            <a:headEnd/>
+            <a:tailEnd/>
+          </a:ln>
+          <a:effectLst/>
+        </p:spPr>
+      </p:pic>
       <p:sp>
         <p:nvSpPr>
           <p:cNvPr id="2" name="1 Título"/>
@@ -5416,35 +5704,46 @@
           </p:cNvSpPr>
           <p:nvPr>
             <p:ph type="title"/>
-          </p:nvPr>
-        </p:nvSpPr>
-        <p:spPr/>
-        <p:txBody>
-          <a:bodyPr/>
-          <a:lstStyle/>
-          <a:p>
-            <a:r>
-              <a:rPr lang="es-ES" dirty="0" smtClean="0"/>
-              <a:t>Descripción General</a:t>
-            </a:r>
-            <a:endParaRPr lang="es-ES" dirty="0"/>
-          </a:p>
-        </p:txBody>
-      </p:sp>
-      <p:sp>
-        <p:nvSpPr>
-          <p:cNvPr id="3" name="2 Marcador de contenido"/>
-          <p:cNvSpPr>
-            <a:spLocks noGrp="1"/>
-          </p:cNvSpPr>
-          <p:nvPr>
-            <p:ph idx="1"/>
           </p:nvPr>
         </p:nvSpPr>
         <p:spPr>
           <a:xfrm>
-            <a:off x="1435608" y="1447800"/>
-            <a:ext cx="7498080" cy="5195910"/>
+            <a:off x="1214414" y="285728"/>
+            <a:ext cx="7498080" cy="1143000"/>
+          </a:xfrm>
+        </p:spPr>
+        <p:txBody>
+          <a:bodyPr>
+            <a:normAutofit fontScale="90000"/>
+          </a:bodyPr>
+          <a:lstStyle/>
+          <a:p>
+            <a:r>
+              <a:rPr lang="es-ES" b="1" dirty="0" smtClean="0"/>
+              <a:t>OCU</a:t>
+            </a:r>
+            <a:r>
+              <a:rPr lang="es-ES" dirty="0" smtClean="0"/>
+              <a:t> (Organización de Consumidores y Usuarios)</a:t>
+            </a:r>
+            <a:endParaRPr lang="es-ES" dirty="0"/>
+          </a:p>
+        </p:txBody>
+      </p:sp>
+      <p:sp>
+        <p:nvSpPr>
+          <p:cNvPr id="3" name="2 Marcador de contenido"/>
+          <p:cNvSpPr>
+            <a:spLocks noGrp="1"/>
+          </p:cNvSpPr>
+          <p:nvPr>
+            <p:ph idx="1"/>
+          </p:nvPr>
+        </p:nvSpPr>
+        <p:spPr>
+          <a:xfrm>
+            <a:off x="1428728" y="1357298"/>
+            <a:ext cx="7498080" cy="4800600"/>
           </a:xfrm>
         </p:spPr>
         <p:txBody>
@@ -5453,31 +5752,101 @@
           </a:bodyPr>
           <a:lstStyle/>
           <a:p>
+            <a:endParaRPr lang="es-ES" sz="2800" dirty="0" smtClean="0"/>
+          </a:p>
+          <a:p>
             <a:r>
               <a:rPr lang="es-ES" sz="2800" dirty="0" smtClean="0"/>
-              <a:t>Servicio que permite asesoramiento a la hora de realizar una compra de supermercado.</a:t>
-            </a:r>
-          </a:p>
-          <a:p>
-            <a:endParaRPr lang="es-ES" sz="2800" dirty="0" smtClean="0"/>
-          </a:p>
-          <a:p>
-            <a:r>
-              <a:rPr lang="es-ES" sz="2800" dirty="0" smtClean="0"/>
-              <a:t>Sugiere compras óptimas en función del precio del producto y la calidad medida por encuestas de usuarios.</a:t>
-            </a:r>
-          </a:p>
-          <a:p>
-            <a:endParaRPr lang="es-ES" sz="2800" dirty="0" smtClean="0"/>
-          </a:p>
-          <a:p>
-            <a:r>
-              <a:rPr lang="es-ES" sz="2800" dirty="0" smtClean="0"/>
-              <a:t>Permite ver la lista de artículos de un supermercado dado.</a:t>
-            </a:r>
-          </a:p>
-        </p:txBody>
-      </p:sp>
+              <a:t> </a:t>
+            </a:r>
+            <a:r>
+              <a:rPr lang="es-ES" sz="2400" dirty="0" smtClean="0"/>
+              <a:t>Es </a:t>
+            </a:r>
+            <a:r>
+              <a:rPr lang="es-ES" sz="2400" dirty="0" smtClean="0"/>
+              <a:t>una organización </a:t>
+            </a:r>
+            <a:r>
+              <a:rPr lang="es-ES" sz="2400" b="1" dirty="0" smtClean="0"/>
+              <a:t>privada</a:t>
+            </a:r>
+            <a:r>
+              <a:rPr lang="es-ES" sz="2400" dirty="0" smtClean="0"/>
+              <a:t> independiente, creada en </a:t>
+            </a:r>
+            <a:r>
+              <a:rPr lang="es-ES" sz="2400" b="1" dirty="0" smtClean="0"/>
+              <a:t>1975</a:t>
+            </a:r>
+            <a:r>
+              <a:rPr lang="es-ES" sz="2400" dirty="0" smtClean="0"/>
+              <a:t>, </a:t>
+            </a:r>
+            <a:r>
+              <a:rPr lang="es-ES" sz="2400" b="1" dirty="0" smtClean="0"/>
+              <a:t>sin ánimo de lucro</a:t>
+            </a:r>
+            <a:r>
+              <a:rPr lang="es-ES" sz="2400" dirty="0" smtClean="0"/>
+              <a:t>, con la finalidad de </a:t>
+            </a:r>
+            <a:r>
+              <a:rPr lang="es-ES" sz="2400" b="1" u="sng" dirty="0" smtClean="0"/>
+              <a:t>defender los derechos de los consumidores</a:t>
+            </a:r>
+            <a:r>
+              <a:rPr lang="es-ES" sz="2400" dirty="0" smtClean="0"/>
+              <a:t>. La OCU no recibe subvenciones, sino que es </a:t>
+            </a:r>
+            <a:r>
+              <a:rPr lang="es-ES" sz="2400" b="1" dirty="0" smtClean="0"/>
+              <a:t>financiada</a:t>
+            </a:r>
+            <a:r>
+              <a:rPr lang="es-ES" sz="2400" dirty="0" smtClean="0"/>
+              <a:t> con las contribuciones de sus </a:t>
+            </a:r>
+            <a:r>
+              <a:rPr lang="es-ES" sz="2400" b="1" dirty="0" smtClean="0"/>
+              <a:t>socios</a:t>
+            </a:r>
+            <a:r>
+              <a:rPr lang="es-ES" sz="2400" dirty="0" smtClean="0"/>
+              <a:t>, </a:t>
+            </a:r>
+            <a:r>
+              <a:rPr lang="es-ES" sz="2400" dirty="0" smtClean="0"/>
+              <a:t>actualmente más de 300.000.</a:t>
+            </a:r>
+            <a:endParaRPr lang="es-ES" sz="2800" dirty="0"/>
+          </a:p>
+        </p:txBody>
+      </p:sp>
+      <p:pic>
+        <p:nvPicPr>
+          <p:cNvPr id="5" name="4 Imagen" descr="C.-Futbol-Defensa-del-consumidor.jpg"/>
+          <p:cNvPicPr>
+            <a:picLocks noChangeAspect="1"/>
+          </p:cNvPicPr>
+          <p:nvPr/>
+        </p:nvPicPr>
+        <p:blipFill>
+          <a:blip r:embed="rId3"/>
+          <a:stretch>
+            <a:fillRect/>
+          </a:stretch>
+        </p:blipFill>
+        <p:spPr>
+          <a:xfrm>
+            <a:off x="3857620" y="4500570"/>
+            <a:ext cx="2143140" cy="2143140"/>
+          </a:xfrm>
+          <a:prstGeom prst="rect">
+            <a:avLst/>
+          </a:prstGeom>
+        </p:spPr>
+      </p:pic>
     </p:spTree>
   </p:cSld>
   <p:clrMapOvr>
@@ -5527,7 +5896,7 @@
           <a:p>
             <a:r>
               <a:rPr lang="es-ES" dirty="0" smtClean="0"/>
-              <a:t>Especificación de Requisitos</a:t>
+              <a:t>Descripción General</a:t>
             </a:r>
             <a:endParaRPr lang="es-ES" dirty="0"/>
           </a:p>
@@ -5545,45 +5914,38 @@
         </p:nvSpPr>
         <p:spPr>
           <a:xfrm>
-            <a:off x="1645920" y="2057400"/>
-            <a:ext cx="7498080" cy="4800600"/>
+            <a:off x="1435608" y="1447800"/>
+            <a:ext cx="7498080" cy="5195910"/>
           </a:xfrm>
         </p:spPr>
         <p:txBody>
-          <a:bodyPr/>
+          <a:bodyPr>
+            <a:normAutofit/>
+          </a:bodyPr>
           <a:lstStyle/>
           <a:p>
             <a:r>
-              <a:rPr lang="es-ES" dirty="0" smtClean="0"/>
-              <a:t>Requisitos Generales</a:t>
-            </a:r>
-          </a:p>
-          <a:p>
-            <a:endParaRPr lang="es-ES" dirty="0" smtClean="0"/>
-          </a:p>
-          <a:p>
-            <a:r>
-              <a:rPr lang="es-ES" dirty="0" smtClean="0"/>
-              <a:t>Requisitos Funcionales</a:t>
-            </a:r>
-          </a:p>
-          <a:p>
-            <a:endParaRPr lang="es-ES" dirty="0" smtClean="0"/>
-          </a:p>
-          <a:p>
-            <a:r>
-              <a:rPr lang="es-ES" dirty="0" smtClean="0"/>
-              <a:t>Requisitos No funcionales</a:t>
-            </a:r>
-          </a:p>
-          <a:p>
-            <a:endParaRPr lang="es-ES" dirty="0" smtClean="0"/>
-          </a:p>
-          <a:p>
-            <a:pPr>
-              <a:buNone/>
-            </a:pPr>
-            <a:endParaRPr lang="es-ES" dirty="0"/>
+              <a:rPr lang="es-ES" sz="2800" dirty="0" smtClean="0"/>
+              <a:t>Servicio que permite asesoramiento a la hora de realizar una compra de supermercado.</a:t>
+            </a:r>
+          </a:p>
+          <a:p>
+            <a:endParaRPr lang="es-ES" sz="2800" dirty="0" smtClean="0"/>
+          </a:p>
+          <a:p>
+            <a:r>
+              <a:rPr lang="es-ES" sz="2800" dirty="0" smtClean="0"/>
+              <a:t>Sugiere compras óptimas en función del precio del producto y la calidad medida por encuestas de usuarios.</a:t>
+            </a:r>
+          </a:p>
+          <a:p>
+            <a:endParaRPr lang="es-ES" sz="2800" dirty="0" smtClean="0"/>
+          </a:p>
+          <a:p>
+            <a:r>
+              <a:rPr lang="es-ES" sz="2800" dirty="0" smtClean="0"/>
+              <a:t>Permite ver la lista de artículos de un supermercado dado.</a:t>
+            </a:r>
           </a:p>
         </p:txBody>
       </p:sp>
@@ -5636,54 +5998,63 @@
           <a:p>
             <a:r>
               <a:rPr lang="es-ES" dirty="0" smtClean="0"/>
+              <a:t>Especificación de Requisitos</a:t>
+            </a:r>
+            <a:endParaRPr lang="es-ES" dirty="0"/>
+          </a:p>
+        </p:txBody>
+      </p:sp>
+      <p:sp>
+        <p:nvSpPr>
+          <p:cNvPr id="3" name="2 Marcador de contenido"/>
+          <p:cNvSpPr>
+            <a:spLocks noGrp="1"/>
+          </p:cNvSpPr>
+          <p:nvPr>
+            <p:ph idx="1"/>
+          </p:nvPr>
+        </p:nvSpPr>
+        <p:spPr>
+          <a:xfrm>
+            <a:off x="1645920" y="2057400"/>
+            <a:ext cx="7498080" cy="4800600"/>
+          </a:xfrm>
+        </p:spPr>
+        <p:txBody>
+          <a:bodyPr/>
+          <a:lstStyle/>
+          <a:p>
+            <a:r>
+              <a:rPr lang="es-ES" dirty="0" smtClean="0"/>
               <a:t>Requisitos Generales</a:t>
             </a:r>
+          </a:p>
+          <a:p>
+            <a:endParaRPr lang="es-ES" dirty="0" smtClean="0"/>
+          </a:p>
+          <a:p>
+            <a:r>
+              <a:rPr lang="es-ES" dirty="0" smtClean="0"/>
+              <a:t>Requisitos Funcionales</a:t>
+            </a:r>
+          </a:p>
+          <a:p>
+            <a:endParaRPr lang="es-ES" dirty="0" smtClean="0"/>
+          </a:p>
+          <a:p>
+            <a:r>
+              <a:rPr lang="es-ES" dirty="0" smtClean="0"/>
+              <a:t>Requisitos No funcionales</a:t>
+            </a:r>
+          </a:p>
+          <a:p>
+            <a:endParaRPr lang="es-ES" dirty="0" smtClean="0"/>
+          </a:p>
+          <a:p>
+            <a:pPr>
+              <a:buNone/>
+            </a:pPr>
             <a:endParaRPr lang="es-ES" dirty="0"/>
-          </a:p>
-        </p:txBody>
-      </p:sp>
-      <p:sp>
-        <p:nvSpPr>
-          <p:cNvPr id="3" name="2 Marcador de contenido"/>
-          <p:cNvSpPr>
-            <a:spLocks noGrp="1"/>
-          </p:cNvSpPr>
-          <p:nvPr>
-            <p:ph idx="1"/>
-          </p:nvPr>
-        </p:nvSpPr>
-        <p:spPr/>
-        <p:txBody>
-          <a:bodyPr>
-            <a:normAutofit/>
-          </a:bodyPr>
-          <a:lstStyle/>
-          <a:p>
-            <a:pPr lvl="0"/>
-            <a:r>
-              <a:rPr lang="es-ES" sz="2800" b="1" dirty="0" smtClean="0"/>
-              <a:t>Principal 1</a:t>
-            </a:r>
-            <a:r>
-              <a:rPr lang="es-ES" sz="2800" dirty="0" smtClean="0"/>
-              <a:t>: El sistema debe permitir seleccionar un tipo de producto en un menú, proporcionando una sugerencia óptima en base al precio y a la puntuación de las encuestas.  </a:t>
-            </a:r>
-          </a:p>
-          <a:p>
-            <a:pPr lvl="0"/>
-            <a:endParaRPr lang="es-ES" sz="2800" dirty="0" smtClean="0"/>
-          </a:p>
-          <a:p>
-            <a:pPr lvl="0"/>
-            <a:r>
-              <a:rPr lang="es-ES" sz="2800" b="1" dirty="0" smtClean="0"/>
-              <a:t>Principal 2</a:t>
-            </a:r>
-            <a:r>
-              <a:rPr lang="es-ES" sz="2800" dirty="0" smtClean="0"/>
-              <a:t>: El sistema debe permitir acceder a un catálogo de productos de un supermercado dado y gestionar la lista de la compra. </a:t>
-            </a:r>
-            <a:endParaRPr lang="es-ES" sz="2800" dirty="0"/>
           </a:p>
         </p:txBody>
       </p:sp>
@@ -5736,7 +6107,7 @@
           <a:p>
             <a:r>
               <a:rPr lang="es-ES" dirty="0" smtClean="0"/>
-              <a:t>Requisitos Funcionales (I)</a:t>
+              <a:t>Requisitos Generales</a:t>
             </a:r>
             <a:endParaRPr lang="es-ES" dirty="0"/>
           </a:p>
@@ -5754,17 +6125,19 @@
         </p:nvSpPr>
         <p:spPr/>
         <p:txBody>
-          <a:bodyPr/>
+          <a:bodyPr>
+            <a:normAutofit/>
+          </a:bodyPr>
           <a:lstStyle/>
           <a:p>
             <a:pPr lvl="0"/>
             <a:r>
               <a:rPr lang="es-ES" sz="2800" b="1" dirty="0" smtClean="0"/>
-              <a:t>Rechazos</a:t>
+              <a:t>Principal 1</a:t>
             </a:r>
             <a:r>
               <a:rPr lang="es-ES" sz="2800" dirty="0" smtClean="0"/>
-              <a:t>: Se debe dar la posibilidad de rechazar una sugerencia de producto o supermercado, y que aparezca en su lugar la siguiente mejor.</a:t>
+              <a:t>: El sistema debe permitir seleccionar un tipo de producto en un menú, proporcionando una sugerencia óptima en base al precio y a la puntuación de las encuestas.  </a:t>
             </a:r>
           </a:p>
           <a:p>
@@ -5774,47 +6147,14 @@
           <a:p>
             <a:pPr lvl="0"/>
             <a:r>
-              <a:rPr lang="es-ES" sz="2800" b="1" dirty="0" err="1" smtClean="0"/>
-              <a:t>Login</a:t>
+              <a:rPr lang="es-ES" sz="2800" b="1" dirty="0" smtClean="0"/>
+              <a:t>Principal 2</a:t>
             </a:r>
             <a:r>
               <a:rPr lang="es-ES" sz="2800" dirty="0" smtClean="0"/>
-              <a:t>: Debe existir sistema de registro y </a:t>
-            </a:r>
-            <a:r>
-              <a:rPr lang="es-ES" sz="2800" dirty="0" err="1" smtClean="0"/>
-              <a:t>login</a:t>
-            </a:r>
-            <a:r>
-              <a:rPr lang="es-ES" sz="2800" dirty="0" smtClean="0"/>
-              <a:t> de usuarios.</a:t>
-            </a:r>
-          </a:p>
-          <a:p>
-            <a:pPr lvl="1"/>
-            <a:r>
-              <a:rPr lang="es-ES" sz="2400" b="1" dirty="0" err="1" smtClean="0"/>
-              <a:t>Newsletters</a:t>
-            </a:r>
-            <a:r>
-              <a:rPr lang="es-ES" sz="2400" dirty="0" smtClean="0"/>
-              <a:t>: Envío de </a:t>
-            </a:r>
-            <a:r>
-              <a:rPr lang="es-ES" sz="2400" dirty="0" err="1" smtClean="0"/>
-              <a:t>newsletters</a:t>
-            </a:r>
-            <a:r>
-              <a:rPr lang="es-ES" sz="2400" dirty="0" smtClean="0"/>
-              <a:t> con nuevas ofertas  a los usuarios registrados.</a:t>
-            </a:r>
-          </a:p>
-          <a:p>
-            <a:pPr lvl="0"/>
-            <a:endParaRPr lang="es-ES" sz="2800" dirty="0" smtClean="0"/>
-          </a:p>
-          <a:p>
-            <a:endParaRPr lang="es-ES" dirty="0"/>
+              <a:t>: El sistema debe permitir acceder a un catálogo de productos de un supermercado dado y gestionar la lista de la compra. </a:t>
+            </a:r>
+            <a:endParaRPr lang="es-ES" sz="2800" dirty="0"/>
           </a:p>
         </p:txBody>
       </p:sp>
@@ -5867,7 +6207,7 @@
           <a:p>
             <a:r>
               <a:rPr lang="es-ES" dirty="0" smtClean="0"/>
-              <a:t>Requisitos Funcionales (II)</a:t>
+              <a:t>Requisitos Funcionales (I)</a:t>
             </a:r>
             <a:endParaRPr lang="es-ES" dirty="0"/>
           </a:p>
@@ -5891,11 +6231,15 @@
             <a:pPr lvl="0"/>
             <a:r>
               <a:rPr lang="es-ES" sz="2800" b="1" dirty="0" smtClean="0"/>
-              <a:t>Historial</a:t>
+              <a:t>Rechazos</a:t>
             </a:r>
             <a:r>
               <a:rPr lang="es-ES" sz="2800" dirty="0" smtClean="0"/>
-              <a:t>: Se registran las últimas 5 listas de la compra realizadas por un usuario.</a:t>
+              <a:t>: Se debe dar la posibilidad de rechazar una sugerencia de producto o supermercado, y que aparezca en su lugar la siguiente mejor</a:t>
+            </a:r>
+            <a:r>
+              <a:rPr lang="es-ES" sz="2800" dirty="0" smtClean="0"/>
+              <a:t>.</a:t>
             </a:r>
           </a:p>
           <a:p>
@@ -5903,30 +6247,53 @@
             <a:endParaRPr lang="es-ES" sz="2800" dirty="0" smtClean="0"/>
           </a:p>
           <a:p>
-            <a:r>
-              <a:rPr lang="es-ES" sz="2800" b="1" dirty="0" smtClean="0"/>
-              <a:t>Mapa</a:t>
+            <a:pPr lvl="0"/>
+            <a:r>
+              <a:rPr lang="es-ES" sz="2800" b="1" dirty="0" err="1" smtClean="0"/>
+              <a:t>Login</a:t>
             </a:r>
             <a:r>
               <a:rPr lang="es-ES" sz="2800" dirty="0" smtClean="0"/>
-              <a:t>: Tiene que haber un mapa que separe el sistema por regiones geográficas.(*)</a:t>
-            </a:r>
-          </a:p>
-          <a:p>
+              <a:t>: Debe existir sistema de registro y </a:t>
+            </a:r>
+            <a:r>
+              <a:rPr lang="es-ES" sz="2800" dirty="0" err="1" smtClean="0"/>
+              <a:t>login</a:t>
+            </a:r>
+            <a:r>
+              <a:rPr lang="es-ES" sz="2800" dirty="0" smtClean="0"/>
+              <a:t> de usuarios.</a:t>
+            </a:r>
+          </a:p>
+          <a:p>
+            <a:pPr lvl="1"/>
+            <a:r>
+              <a:rPr lang="es-ES" sz="2400" b="1" dirty="0" err="1" smtClean="0"/>
+              <a:t>Newsletters</a:t>
+            </a:r>
+            <a:r>
+              <a:rPr lang="es-ES" sz="2400" dirty="0" smtClean="0"/>
+              <a:t>: Envío de </a:t>
+            </a:r>
+            <a:r>
+              <a:rPr lang="es-ES" sz="2400" dirty="0" err="1" smtClean="0"/>
+              <a:t>newsletters</a:t>
+            </a:r>
+            <a:r>
+              <a:rPr lang="es-ES" sz="2400" dirty="0" smtClean="0"/>
+              <a:t> con nuevas ofertas  a los usuarios registrados.</a:t>
+            </a:r>
+          </a:p>
+          <a:p>
+            <a:pPr lvl="0">
+              <a:buNone/>
+            </a:pPr>
             <a:endParaRPr lang="es-ES" sz="2800" dirty="0" smtClean="0"/>
           </a:p>
           <a:p>
-            <a:pPr lvl="0"/>
-            <a:r>
-              <a:rPr lang="es-ES" sz="2800" b="1" dirty="0" smtClean="0"/>
-              <a:t>Compra</a:t>
-            </a:r>
-            <a:r>
-              <a:rPr lang="es-ES" sz="2800" dirty="0" smtClean="0"/>
-              <a:t>: Se tiene implementar el servicio de compra online de manera transparente al usuario.(*)</a:t>
-            </a:r>
-          </a:p>
-          <a:p>
+            <a:pPr lvl="0">
+              <a:buNone/>
+            </a:pPr>
             <a:endParaRPr lang="es-ES" sz="2800" dirty="0" smtClean="0"/>
           </a:p>
           <a:p>
@@ -5983,7 +6350,7 @@
           <a:p>
             <a:r>
               <a:rPr lang="es-ES" dirty="0" smtClean="0"/>
-              <a:t>Requisitos Funcionales (III)</a:t>
+              <a:t>Requisitos Funcionales (II)</a:t>
             </a:r>
             <a:endParaRPr lang="es-ES" dirty="0"/>
           </a:p>
@@ -6001,42 +6368,49 @@
         </p:nvSpPr>
         <p:spPr/>
         <p:txBody>
-          <a:bodyPr>
-            <a:normAutofit/>
-          </a:bodyPr>
+          <a:bodyPr/>
           <a:lstStyle/>
           <a:p>
             <a:pPr lvl="0"/>
             <a:r>
               <a:rPr lang="es-ES" sz="2800" b="1" dirty="0" smtClean="0"/>
-              <a:t>Encuestas</a:t>
+              <a:t>Historial</a:t>
             </a:r>
             <a:r>
               <a:rPr lang="es-ES" sz="2800" dirty="0" smtClean="0"/>
-              <a:t>: El sistema debe permitir la posibilidad de realizar encuestas de calidad de productos y comercios, así como del propio servicio web.</a:t>
-            </a:r>
-          </a:p>
-          <a:p>
-            <a:pPr lvl="1"/>
-            <a:r>
-              <a:rPr lang="es-ES" sz="2400" b="1" dirty="0" smtClean="0"/>
-              <a:t>Encuestas 1</a:t>
-            </a:r>
-            <a:r>
-              <a:rPr lang="es-ES" sz="2400" dirty="0" smtClean="0"/>
-              <a:t>: Después de cada sugerencia de compra, el usuario puede calificar el servicio web. </a:t>
-            </a:r>
-          </a:p>
-          <a:p>
-            <a:pPr lvl="1"/>
-            <a:r>
-              <a:rPr lang="es-ES" sz="2400" b="1" dirty="0" smtClean="0"/>
-              <a:t>Encuestas 2</a:t>
-            </a:r>
-            <a:r>
-              <a:rPr lang="es-ES" sz="2400" dirty="0" smtClean="0"/>
-              <a:t>: El sistema debe realizar un ranking de comercios en función de los datos de calidad proporcionados por el usuario.</a:t>
-            </a:r>
+              <a:t>: Se registran las últimas 5 listas de la compra realizadas por un usuario.</a:t>
+            </a:r>
+          </a:p>
+          <a:p>
+            <a:pPr lvl="0"/>
+            <a:endParaRPr lang="es-ES" sz="2800" dirty="0" smtClean="0"/>
+          </a:p>
+          <a:p>
+            <a:r>
+              <a:rPr lang="es-ES" sz="2800" b="1" dirty="0" smtClean="0"/>
+              <a:t>Mapa</a:t>
+            </a:r>
+            <a:r>
+              <a:rPr lang="es-ES" sz="2800" dirty="0" smtClean="0"/>
+              <a:t>: Tiene que haber un mapa que separe el sistema por regiones geográficas.(*)</a:t>
+            </a:r>
+          </a:p>
+          <a:p>
+            <a:endParaRPr lang="es-ES" sz="2800" dirty="0" smtClean="0"/>
+          </a:p>
+          <a:p>
+            <a:pPr lvl="0"/>
+            <a:r>
+              <a:rPr lang="es-ES" sz="2800" b="1" dirty="0" smtClean="0"/>
+              <a:t>Compra</a:t>
+            </a:r>
+            <a:r>
+              <a:rPr lang="es-ES" sz="2800" dirty="0" smtClean="0"/>
+              <a:t>: Se tiene implementar el servicio de compra online de manera transparente al usuario.(*)</a:t>
+            </a:r>
+          </a:p>
+          <a:p>
+            <a:endParaRPr lang="es-ES" sz="2800" dirty="0" smtClean="0"/>
           </a:p>
           <a:p>
             <a:endParaRPr lang="es-ES" dirty="0"/>
@@ -6092,7 +6466,7 @@
           <a:p>
             <a:r>
               <a:rPr lang="es-ES" dirty="0" smtClean="0"/>
-              <a:t>Requisitos Funcionales (IV)</a:t>
+              <a:t>Requisitos Funcionales (III)</a:t>
             </a:r>
             <a:endParaRPr lang="es-ES" dirty="0"/>
           </a:p>
@@ -6118,65 +6492,34 @@
             <a:pPr lvl="0"/>
             <a:r>
               <a:rPr lang="es-ES" sz="2800" b="1" dirty="0" smtClean="0"/>
-              <a:t>Sugerencias</a:t>
+              <a:t>Encuestas</a:t>
             </a:r>
             <a:r>
               <a:rPr lang="es-ES" sz="2800" dirty="0" smtClean="0"/>
-              <a:t> :El sistema debe implementar una ventana de sugerencias para dar “</a:t>
-            </a:r>
-            <a:r>
-              <a:rPr lang="es-ES" sz="2800" dirty="0" err="1" smtClean="0"/>
-              <a:t>feedback</a:t>
-            </a:r>
-            <a:r>
-              <a:rPr lang="es-ES" sz="2800" dirty="0" smtClean="0"/>
-              <a:t>” del servicio.</a:t>
-            </a:r>
-          </a:p>
-          <a:p>
-            <a:pPr lvl="0"/>
-            <a:r>
-              <a:rPr lang="es-ES" sz="2800" b="1" dirty="0" smtClean="0"/>
-              <a:t>Categorías </a:t>
-            </a:r>
-            <a:r>
-              <a:rPr lang="es-ES" sz="2800" dirty="0" smtClean="0"/>
-              <a:t>: El sistema  debe agrupar los alimentos por categorías (lácteos, fruta, </a:t>
-            </a:r>
-            <a:r>
-              <a:rPr lang="es-ES" sz="2800" dirty="0" err="1" smtClean="0"/>
-              <a:t>etc</a:t>
-            </a:r>
-            <a:r>
-              <a:rPr lang="es-ES" sz="2800" dirty="0" smtClean="0"/>
-              <a:t>).</a:t>
-            </a:r>
-          </a:p>
-          <a:p>
-            <a:pPr lvl="0"/>
-            <a:r>
-              <a:rPr lang="es-ES" sz="2800" b="1" dirty="0" smtClean="0"/>
-              <a:t>Ayudante</a:t>
-            </a:r>
-            <a:r>
-              <a:rPr lang="es-ES" sz="2800" dirty="0" smtClean="0"/>
-              <a:t>: La web debe disponer de un ayudante interactivo.(*)</a:t>
-            </a:r>
-          </a:p>
-          <a:p>
-            <a:pPr lvl="0"/>
-            <a:r>
-              <a:rPr lang="es-ES" sz="2800" b="1" dirty="0" smtClean="0"/>
-              <a:t>Ofertas</a:t>
-            </a:r>
-            <a:r>
-              <a:rPr lang="es-ES" sz="2800" dirty="0" smtClean="0"/>
-              <a:t>: Debe aparecer un deslizable con las ofertas más importantes.</a:t>
-            </a:r>
-          </a:p>
-          <a:p>
-            <a:pPr lvl="0"/>
-            <a:endParaRPr lang="es-ES" sz="2800" dirty="0" smtClean="0"/>
+              <a:t>: El sistema debe permitir la posibilidad de realizar encuestas de calidad de productos y comercios, así como del propio servicio web.</a:t>
+            </a:r>
+          </a:p>
+          <a:p>
+            <a:pPr lvl="1"/>
+            <a:r>
+              <a:rPr lang="es-ES" sz="2400" b="1" dirty="0" smtClean="0"/>
+              <a:t>Encuestas 1</a:t>
+            </a:r>
+            <a:r>
+              <a:rPr lang="es-ES" sz="2400" dirty="0" smtClean="0"/>
+              <a:t>: Después de cada sugerencia de compra, el usuario puede calificar el servicio web. </a:t>
+            </a:r>
+          </a:p>
+          <a:p>
+            <a:pPr lvl="1"/>
+            <a:r>
+              <a:rPr lang="es-ES" sz="2400" b="1" dirty="0" smtClean="0"/>
+              <a:t>Encuestas 2</a:t>
+            </a:r>
+            <a:r>
+              <a:rPr lang="es-ES" sz="2400" dirty="0" smtClean="0"/>
+              <a:t>: El sistema debe realizar un ranking de comercios en función de los datos de calidad proporcionados por el usuario.</a:t>
+            </a:r>
           </a:p>
           <a:p>
             <a:endParaRPr lang="es-ES" dirty="0"/>
@@ -6232,7 +6575,7 @@
           <a:p>
             <a:r>
               <a:rPr lang="es-ES" dirty="0" smtClean="0"/>
-              <a:t>Requisitos Funcionales (*)</a:t>
+              <a:t>Requisitos Funcionales (IV)</a:t>
             </a:r>
             <a:endParaRPr lang="es-ES" dirty="0"/>
           </a:p>
@@ -6251,70 +6594,64 @@
         <p:spPr/>
         <p:txBody>
           <a:bodyPr>
-            <a:normAutofit lnSpcReduction="10000"/>
+            <a:normAutofit/>
           </a:bodyPr>
           <a:lstStyle/>
           <a:p>
+            <a:pPr lvl="0"/>
+            <a:r>
+              <a:rPr lang="es-ES" sz="2800" b="1" dirty="0" smtClean="0"/>
+              <a:t>Sugerencias</a:t>
+            </a:r>
+            <a:r>
+              <a:rPr lang="es-ES" sz="2800" dirty="0" smtClean="0"/>
+              <a:t> :El sistema debe implementar una ventana de sugerencias para dar “</a:t>
+            </a:r>
+            <a:r>
+              <a:rPr lang="es-ES" sz="2800" dirty="0" err="1" smtClean="0"/>
+              <a:t>feedback</a:t>
+            </a:r>
+            <a:r>
+              <a:rPr lang="es-ES" sz="2800" dirty="0" smtClean="0"/>
+              <a:t>” del servicio.</a:t>
+            </a:r>
+          </a:p>
+          <a:p>
+            <a:pPr lvl="0"/>
+            <a:endParaRPr lang="es-ES" sz="2800" b="1" dirty="0" smtClean="0"/>
+          </a:p>
+          <a:p>
+            <a:pPr lvl="0"/>
+            <a:r>
+              <a:rPr lang="es-ES" sz="2800" b="1" dirty="0" smtClean="0"/>
+              <a:t>Ayudante</a:t>
+            </a:r>
+            <a:r>
+              <a:rPr lang="es-ES" sz="2800" dirty="0" smtClean="0"/>
+              <a:t>: La web debe disponer de un ayudante interactivo.(*)</a:t>
+            </a:r>
+          </a:p>
+          <a:p>
+            <a:pPr lvl="0"/>
+            <a:endParaRPr lang="es-ES" sz="2800" b="1" dirty="0" smtClean="0"/>
+          </a:p>
+          <a:p>
+            <a:pPr lvl="0"/>
+            <a:r>
+              <a:rPr lang="es-ES" sz="2800" b="1" dirty="0" smtClean="0"/>
+              <a:t>Ofertas</a:t>
+            </a:r>
+            <a:r>
+              <a:rPr lang="es-ES" sz="2800" dirty="0" smtClean="0"/>
+              <a:t>: Debe aparecer un deslizable con las ofertas más importantes.</a:t>
+            </a:r>
+          </a:p>
+          <a:p>
+            <a:pPr lvl="0"/>
             <a:endParaRPr lang="es-ES" sz="2800" dirty="0" smtClean="0"/>
           </a:p>
           <a:p>
-            <a:r>
-              <a:rPr lang="es-ES" sz="2800" b="1" dirty="0" smtClean="0"/>
-              <a:t>Mapa</a:t>
-            </a:r>
-            <a:r>
-              <a:rPr lang="es-ES" sz="2800" dirty="0" smtClean="0"/>
-              <a:t>. Propuesta de mejor solución:</a:t>
-            </a:r>
-          </a:p>
-          <a:p>
-            <a:pPr lvl="1"/>
-            <a:r>
-              <a:rPr lang="es-ES" sz="2400" dirty="0" smtClean="0"/>
-              <a:t>1º Se permite rechazar sugerencias.(Ver </a:t>
-            </a:r>
-            <a:r>
-              <a:rPr lang="es-ES" sz="2400" b="1" dirty="0" smtClean="0"/>
-              <a:t>rechazos</a:t>
-            </a:r>
-            <a:r>
-              <a:rPr lang="es-ES" sz="2400" dirty="0" smtClean="0"/>
-              <a:t>)</a:t>
-            </a:r>
-            <a:endParaRPr lang="es-ES" sz="2400" b="1" dirty="0" smtClean="0"/>
-          </a:p>
-          <a:p>
-            <a:pPr lvl="1"/>
-            <a:r>
-              <a:rPr lang="es-ES" sz="2400" dirty="0" smtClean="0"/>
-              <a:t>2º Cada usuario puede elegir su región como atributo de usuario y aparecerán solo sugerencias para dicha región.</a:t>
-            </a:r>
-          </a:p>
-          <a:p>
-            <a:endParaRPr lang="es-ES" sz="2800" dirty="0" smtClean="0"/>
-          </a:p>
-          <a:p>
-            <a:r>
-              <a:rPr lang="es-ES" sz="2800" b="1" dirty="0" smtClean="0"/>
-              <a:t>Compra</a:t>
-            </a:r>
-            <a:r>
-              <a:rPr lang="es-ES" sz="2800" dirty="0" smtClean="0"/>
-              <a:t>. Se rechaza en un principio por inviabilidad (requiere de acuerdos con comercios).</a:t>
-            </a:r>
-          </a:p>
-          <a:p>
-            <a:endParaRPr lang="es-ES" sz="2800" dirty="0" smtClean="0"/>
-          </a:p>
-          <a:p>
-            <a:pPr lvl="1"/>
-            <a:endParaRPr lang="es-ES" sz="2400" dirty="0" smtClean="0"/>
-          </a:p>
-          <a:p>
-            <a:pPr lvl="1">
-              <a:buNone/>
-            </a:pPr>
-            <a:endParaRPr lang="es-ES" sz="2400" dirty="0" smtClean="0"/>
+            <a:endParaRPr lang="es-ES" dirty="0"/>
           </a:p>
         </p:txBody>
       </p:sp>

</xml_diff>